<commit_message>
preparing for board meeting
</commit_message>
<xml_diff>
--- a/ProgramsHandbook/ProgramArchives/20211025AnnualPlanning.pptx
+++ b/ProgramsHandbook/ProgramArchives/20211025AnnualPlanning.pptx
@@ -12,22 +12,23 @@
     <p:sldId id="343" r:id="rId6"/>
     <p:sldId id="342" r:id="rId7"/>
     <p:sldId id="352" r:id="rId8"/>
-    <p:sldId id="350" r:id="rId9"/>
-    <p:sldId id="359" r:id="rId10"/>
-    <p:sldId id="353" r:id="rId11"/>
-    <p:sldId id="355" r:id="rId12"/>
-    <p:sldId id="360" r:id="rId13"/>
-    <p:sldId id="361" r:id="rId14"/>
-    <p:sldId id="363" r:id="rId15"/>
-    <p:sldId id="362" r:id="rId16"/>
-    <p:sldId id="354" r:id="rId17"/>
-    <p:sldId id="357" r:id="rId18"/>
-    <p:sldId id="364" r:id="rId19"/>
-    <p:sldId id="356" r:id="rId20"/>
-    <p:sldId id="358" r:id="rId21"/>
-    <p:sldId id="365" r:id="rId22"/>
-    <p:sldId id="346" r:id="rId23"/>
-    <p:sldId id="348" r:id="rId24"/>
+    <p:sldId id="366" r:id="rId9"/>
+    <p:sldId id="350" r:id="rId10"/>
+    <p:sldId id="359" r:id="rId11"/>
+    <p:sldId id="353" r:id="rId12"/>
+    <p:sldId id="355" r:id="rId13"/>
+    <p:sldId id="360" r:id="rId14"/>
+    <p:sldId id="361" r:id="rId15"/>
+    <p:sldId id="363" r:id="rId16"/>
+    <p:sldId id="362" r:id="rId17"/>
+    <p:sldId id="354" r:id="rId18"/>
+    <p:sldId id="357" r:id="rId19"/>
+    <p:sldId id="364" r:id="rId20"/>
+    <p:sldId id="356" r:id="rId21"/>
+    <p:sldId id="358" r:id="rId22"/>
+    <p:sldId id="365" r:id="rId23"/>
+    <p:sldId id="346" r:id="rId24"/>
+    <p:sldId id="348" r:id="rId25"/>
   </p:sldIdLst>
   <p:sldSz cx="12192000" cy="6858000"/>
   <p:notesSz cx="6858000" cy="9144000"/>
@@ -19158,7 +19159,7 @@
           <a:p>
             <a:fld id="{E117E0DC-5939-6843-AF2B-4DE427CCEDEF}" type="datetimeFigureOut">
               <a:rPr lang="en-US" smtClean="0"/>
-              <a:t>10/18/21</a:t>
+              <a:t>10/25/21</a:t>
             </a:fld>
             <a:endParaRPr lang="en-US"/>
           </a:p>
@@ -19356,7 +19357,7 @@
           <a:p>
             <a:fld id="{E117E0DC-5939-6843-AF2B-4DE427CCEDEF}" type="datetimeFigureOut">
               <a:rPr lang="en-US" smtClean="0"/>
-              <a:t>10/18/21</a:t>
+              <a:t>10/25/21</a:t>
             </a:fld>
             <a:endParaRPr lang="en-US"/>
           </a:p>
@@ -19564,7 +19565,7 @@
           <a:p>
             <a:fld id="{E117E0DC-5939-6843-AF2B-4DE427CCEDEF}" type="datetimeFigureOut">
               <a:rPr lang="en-US" smtClean="0"/>
-              <a:t>10/18/21</a:t>
+              <a:t>10/25/21</a:t>
             </a:fld>
             <a:endParaRPr lang="en-US"/>
           </a:p>
@@ -19762,7 +19763,7 @@
           <a:p>
             <a:fld id="{E117E0DC-5939-6843-AF2B-4DE427CCEDEF}" type="datetimeFigureOut">
               <a:rPr lang="en-US" smtClean="0"/>
-              <a:t>10/18/21</a:t>
+              <a:t>10/25/21</a:t>
             </a:fld>
             <a:endParaRPr lang="en-US"/>
           </a:p>
@@ -20037,7 +20038,7 @@
           <a:p>
             <a:fld id="{E117E0DC-5939-6843-AF2B-4DE427CCEDEF}" type="datetimeFigureOut">
               <a:rPr lang="en-US" smtClean="0"/>
-              <a:t>10/18/21</a:t>
+              <a:t>10/25/21</a:t>
             </a:fld>
             <a:endParaRPr lang="en-US"/>
           </a:p>
@@ -20302,7 +20303,7 @@
           <a:p>
             <a:fld id="{E117E0DC-5939-6843-AF2B-4DE427CCEDEF}" type="datetimeFigureOut">
               <a:rPr lang="en-US" smtClean="0"/>
-              <a:t>10/18/21</a:t>
+              <a:t>10/25/21</a:t>
             </a:fld>
             <a:endParaRPr lang="en-US"/>
           </a:p>
@@ -20714,7 +20715,7 @@
           <a:p>
             <a:fld id="{E117E0DC-5939-6843-AF2B-4DE427CCEDEF}" type="datetimeFigureOut">
               <a:rPr lang="en-US" smtClean="0"/>
-              <a:t>10/18/21</a:t>
+              <a:t>10/25/21</a:t>
             </a:fld>
             <a:endParaRPr lang="en-US"/>
           </a:p>
@@ -20855,7 +20856,7 @@
           <a:p>
             <a:fld id="{E117E0DC-5939-6843-AF2B-4DE427CCEDEF}" type="datetimeFigureOut">
               <a:rPr lang="en-US" smtClean="0"/>
-              <a:t>10/18/21</a:t>
+              <a:t>10/25/21</a:t>
             </a:fld>
             <a:endParaRPr lang="en-US"/>
           </a:p>
@@ -20968,7 +20969,7 @@
           <a:p>
             <a:fld id="{E117E0DC-5939-6843-AF2B-4DE427CCEDEF}" type="datetimeFigureOut">
               <a:rPr lang="en-US" smtClean="0"/>
-              <a:t>10/18/21</a:t>
+              <a:t>10/25/21</a:t>
             </a:fld>
             <a:endParaRPr lang="en-US"/>
           </a:p>
@@ -21279,7 +21280,7 @@
           <a:p>
             <a:fld id="{E117E0DC-5939-6843-AF2B-4DE427CCEDEF}" type="datetimeFigureOut">
               <a:rPr lang="en-US" smtClean="0"/>
-              <a:t>10/18/21</a:t>
+              <a:t>10/25/21</a:t>
             </a:fld>
             <a:endParaRPr lang="en-US"/>
           </a:p>
@@ -21567,7 +21568,7 @@
           <a:p>
             <a:fld id="{E117E0DC-5939-6843-AF2B-4DE427CCEDEF}" type="datetimeFigureOut">
               <a:rPr lang="en-US" smtClean="0"/>
-              <a:t>10/18/21</a:t>
+              <a:t>10/25/21</a:t>
             </a:fld>
             <a:endParaRPr lang="en-US"/>
           </a:p>
@@ -21808,7 +21809,7 @@
           <a:p>
             <a:fld id="{E117E0DC-5939-6843-AF2B-4DE427CCEDEF}" type="datetimeFigureOut">
               <a:rPr lang="en-US" smtClean="0"/>
-              <a:t>10/18/21</a:t>
+              <a:t>10/25/21</a:t>
             </a:fld>
             <a:endParaRPr lang="en-US"/>
           </a:p>
@@ -22562,6 +22563,260 @@
           <a:chExt cx="0" cy="0"/>
         </a:xfrm>
       </p:grpSpPr>
+      <p:pic>
+        <p:nvPicPr>
+          <p:cNvPr id="5" name="Picture 4">
+            <a:extLst>
+              <a:ext uri="{FF2B5EF4-FFF2-40B4-BE49-F238E27FC236}">
+                <a16:creationId xmlns:a16="http://schemas.microsoft.com/office/drawing/2014/main" id="{256CCD31-9C25-F040-9504-CF9C5ECCF7E0}"/>
+              </a:ext>
+            </a:extLst>
+          </p:cNvPr>
+          <p:cNvPicPr/>
+          <p:nvPr/>
+        </p:nvPicPr>
+        <p:blipFill rotWithShape="1">
+          <a:blip r:embed="rId2" cstate="print">
+            <a:extLst>
+              <a:ext uri="{28A0092B-C50C-407E-A947-70E740481C1C}">
+                <a14:useLocalDpi xmlns:a14="http://schemas.microsoft.com/office/drawing/2010/main" val="0"/>
+              </a:ext>
+            </a:extLst>
+          </a:blip>
+          <a:srcRect l="3239" r="1"/>
+          <a:stretch/>
+        </p:blipFill>
+        <p:spPr bwMode="auto">
+          <a:xfrm>
+            <a:off x="1929445" y="1009313"/>
+            <a:ext cx="2372592" cy="2308324"/>
+          </a:xfrm>
+          <a:prstGeom prst="rect">
+            <a:avLst/>
+          </a:prstGeom>
+          <a:ln>
+            <a:noFill/>
+          </a:ln>
+          <a:extLst>
+            <a:ext uri="{53640926-AAD7-44D8-BBD7-CCE9431645EC}">
+              <a14:shadowObscured xmlns:a14="http://schemas.microsoft.com/office/drawing/2010/main"/>
+            </a:ext>
+          </a:extLst>
+        </p:spPr>
+      </p:pic>
+      <p:sp>
+        <p:nvSpPr>
+          <p:cNvPr id="6" name="Rectangle 5">
+            <a:extLst>
+              <a:ext uri="{FF2B5EF4-FFF2-40B4-BE49-F238E27FC236}">
+                <a16:creationId xmlns:a16="http://schemas.microsoft.com/office/drawing/2014/main" id="{7AC521A6-EA53-6249-9417-2379A244B351}"/>
+              </a:ext>
+            </a:extLst>
+          </p:cNvPr>
+          <p:cNvSpPr/>
+          <p:nvPr/>
+        </p:nvSpPr>
+        <p:spPr>
+          <a:xfrm>
+            <a:off x="1361378" y="3770443"/>
+            <a:ext cx="4158511" cy="1569660"/>
+          </a:xfrm>
+          <a:prstGeom prst="rect">
+            <a:avLst/>
+          </a:prstGeom>
+        </p:spPr>
+        <p:txBody>
+          <a:bodyPr wrap="none">
+            <a:spAutoFit/>
+          </a:bodyPr>
+          <a:lstStyle/>
+          <a:p>
+            <a:pPr>
+              <a:spcAft>
+                <a:spcPts val="1200"/>
+              </a:spcAft>
+            </a:pPr>
+            <a:r>
+              <a:rPr lang="en-US" sz="4800" dirty="0">
+                <a:solidFill>
+                  <a:srgbClr val="24292E"/>
+                </a:solidFill>
+                <a:latin typeface="Optima" panose="02000503060000020004" pitchFamily="2" charset="0"/>
+                <a:ea typeface="Times New Roman" panose="02020603050405020304" pitchFamily="18" charset="0"/>
+                <a:cs typeface="Times New Roman" panose="02020603050405020304" pitchFamily="18" charset="0"/>
+              </a:rPr>
+              <a:t>How are we </a:t>
+            </a:r>
+            <a:br>
+              <a:rPr lang="en-US" sz="4800" dirty="0">
+                <a:solidFill>
+                  <a:srgbClr val="24292E"/>
+                </a:solidFill>
+                <a:latin typeface="Optima" panose="02000503060000020004" pitchFamily="2" charset="0"/>
+                <a:ea typeface="Times New Roman" panose="02020603050405020304" pitchFamily="18" charset="0"/>
+                <a:cs typeface="Times New Roman" panose="02020603050405020304" pitchFamily="18" charset="0"/>
+              </a:rPr>
+            </a:br>
+            <a:r>
+              <a:rPr lang="en-US" sz="4800" dirty="0">
+                <a:solidFill>
+                  <a:srgbClr val="24292E"/>
+                </a:solidFill>
+                <a:latin typeface="Optima" panose="02000503060000020004" pitchFamily="2" charset="0"/>
+                <a:ea typeface="Times New Roman" panose="02020603050405020304" pitchFamily="18" charset="0"/>
+                <a:cs typeface="Times New Roman" panose="02020603050405020304" pitchFamily="18" charset="0"/>
+              </a:rPr>
+              <a:t>fulfilling these?</a:t>
+            </a:r>
+          </a:p>
+        </p:txBody>
+      </p:sp>
+      <p:sp>
+        <p:nvSpPr>
+          <p:cNvPr id="11" name="TextBox 10">
+            <a:extLst>
+              <a:ext uri="{FF2B5EF4-FFF2-40B4-BE49-F238E27FC236}">
+                <a16:creationId xmlns:a16="http://schemas.microsoft.com/office/drawing/2014/main" id="{73BBFE72-4CC4-6941-96FB-8D4DF03F49B4}"/>
+              </a:ext>
+            </a:extLst>
+          </p:cNvPr>
+          <p:cNvSpPr txBox="1"/>
+          <p:nvPr/>
+        </p:nvSpPr>
+        <p:spPr>
+          <a:xfrm>
+            <a:off x="6737742" y="474345"/>
+            <a:ext cx="4382429" cy="5909310"/>
+          </a:xfrm>
+          <a:prstGeom prst="rect">
+            <a:avLst/>
+          </a:prstGeom>
+          <a:noFill/>
+        </p:spPr>
+        <p:txBody>
+          <a:bodyPr wrap="square" rtlCol="0">
+            <a:spAutoFit/>
+          </a:bodyPr>
+          <a:lstStyle/>
+          <a:p>
+            <a:r>
+              <a:rPr lang="en-US" b="1" dirty="0">
+                <a:latin typeface="Optima" panose="02000503060000020004" pitchFamily="2" charset="0"/>
+              </a:rPr>
+              <a:t>Mission</a:t>
+            </a:r>
+          </a:p>
+          <a:p>
+            <a:r>
+              <a:rPr lang="en-US" dirty="0">
+                <a:latin typeface="Optima" panose="02000503060000020004" pitchFamily="2" charset="0"/>
+              </a:rPr>
+              <a:t>The mission of the Data Scientista Society is to educate women pursuing careers related to data science in techniques and competencies needed for career advancement and achieving leadership positions in the field.</a:t>
+            </a:r>
+          </a:p>
+          <a:p>
+            <a:endParaRPr lang="en-US" dirty="0">
+              <a:latin typeface="Optima" panose="02000503060000020004" pitchFamily="2" charset="0"/>
+            </a:endParaRPr>
+          </a:p>
+          <a:p>
+            <a:r>
+              <a:rPr lang="en-US" b="1" dirty="0">
+                <a:latin typeface="Optima" panose="02000503060000020004" pitchFamily="2" charset="0"/>
+              </a:rPr>
+              <a:t>Vision</a:t>
+            </a:r>
+          </a:p>
+          <a:p>
+            <a:r>
+              <a:rPr lang="en-US" dirty="0">
+                <a:latin typeface="Optima" panose="02000503060000020004" pitchFamily="2" charset="0"/>
+              </a:rPr>
+              <a:t>Our vision is to create a world full of data of the women, by the women, and for the women.</a:t>
+            </a:r>
+          </a:p>
+          <a:p>
+            <a:endParaRPr lang="en-US" dirty="0">
+              <a:latin typeface="Optima" panose="02000503060000020004" pitchFamily="2" charset="0"/>
+            </a:endParaRPr>
+          </a:p>
+          <a:p>
+            <a:r>
+              <a:rPr lang="en-US" b="1" dirty="0">
+                <a:latin typeface="Optima" panose="02000503060000020004" pitchFamily="2" charset="0"/>
+              </a:rPr>
+              <a:t>Modus Operandi</a:t>
+            </a:r>
+          </a:p>
+          <a:p>
+            <a:r>
+              <a:rPr lang="en-US" dirty="0">
+                <a:latin typeface="Optima" panose="02000503060000020004" pitchFamily="2" charset="0"/>
+              </a:rPr>
+              <a:t>The modus operandi of the Data Scientista Society is to build relationships among co-located women enthusiastic about data, </a:t>
+            </a:r>
+            <a:r>
+              <a:rPr lang="en-US" dirty="0" err="1">
+                <a:latin typeface="Optima" panose="02000503060000020004" pitchFamily="2" charset="0"/>
+              </a:rPr>
+              <a:t>a.k.a</a:t>
+            </a:r>
+            <a:r>
+              <a:rPr lang="en-US" dirty="0">
+                <a:latin typeface="Optima" panose="02000503060000020004" pitchFamily="2" charset="0"/>
+              </a:rPr>
+              <a:t> data </a:t>
+            </a:r>
+            <a:r>
+              <a:rPr lang="en-US" dirty="0" err="1">
+                <a:latin typeface="Optima" panose="02000503060000020004" pitchFamily="2" charset="0"/>
+              </a:rPr>
+              <a:t>scientistas</a:t>
+            </a:r>
+            <a:r>
+              <a:rPr lang="en-US" dirty="0">
+                <a:latin typeface="Optima" panose="02000503060000020004" pitchFamily="2" charset="0"/>
+              </a:rPr>
+              <a:t>, while also practicing mutual supportiveness towards competency, success, and leadership.</a:t>
+            </a:r>
+          </a:p>
+          <a:p>
+            <a:endParaRPr lang="en-US" dirty="0">
+              <a:latin typeface="Optima" panose="02000503060000020004" pitchFamily="2" charset="0"/>
+            </a:endParaRPr>
+          </a:p>
+        </p:txBody>
+      </p:sp>
+    </p:spTree>
+    <p:extLst>
+      <p:ext uri="{BB962C8B-B14F-4D97-AF65-F5344CB8AC3E}">
+        <p14:creationId xmlns:p14="http://schemas.microsoft.com/office/powerpoint/2010/main" val="4090054677"/>
+      </p:ext>
+    </p:extLst>
+  </p:cSld>
+  <p:clrMapOvr>
+    <a:masterClrMapping/>
+  </p:clrMapOvr>
+</p:sld>
+</file>
+
+<file path=ppt/slides/slide11.xml><?xml version="1.0" encoding="utf-8"?>
+<p:sld xmlns:a="http://schemas.openxmlformats.org/drawingml/2006/main" xmlns:r="http://schemas.openxmlformats.org/officeDocument/2006/relationships" xmlns:p="http://schemas.openxmlformats.org/presentationml/2006/main">
+  <p:cSld>
+    <p:spTree>
+      <p:nvGrpSpPr>
+        <p:cNvPr id="1" name=""/>
+        <p:cNvGrpSpPr/>
+        <p:nvPr/>
+      </p:nvGrpSpPr>
+      <p:grpSpPr>
+        <a:xfrm>
+          <a:off x="0" y="0"/>
+          <a:ext cx="0" cy="0"/>
+          <a:chOff x="0" y="0"/>
+          <a:chExt cx="0" cy="0"/>
+        </a:xfrm>
+      </p:grpSpPr>
       <p:sp>
         <p:nvSpPr>
           <p:cNvPr id="2" name="Title 1">
@@ -23268,7 +23523,7 @@
 </p:sld>
 </file>
 
-<file path=ppt/slides/slide11.xml><?xml version="1.0" encoding="utf-8"?>
+<file path=ppt/slides/slide12.xml><?xml version="1.0" encoding="utf-8"?>
 <p:sld xmlns:a="http://schemas.openxmlformats.org/drawingml/2006/main" xmlns:r="http://schemas.openxmlformats.org/officeDocument/2006/relationships" xmlns:p="http://schemas.openxmlformats.org/presentationml/2006/main">
   <p:cSld>
     <p:spTree>
@@ -23355,7 +23610,7 @@
 </p:sld>
 </file>
 
-<file path=ppt/slides/slide12.xml><?xml version="1.0" encoding="utf-8"?>
+<file path=ppt/slides/slide13.xml><?xml version="1.0" encoding="utf-8"?>
 <p:sld xmlns:a="http://schemas.openxmlformats.org/drawingml/2006/main" xmlns:r="http://schemas.openxmlformats.org/officeDocument/2006/relationships" xmlns:p="http://schemas.openxmlformats.org/presentationml/2006/main">
   <p:cSld>
     <p:spTree>
@@ -23498,7 +23753,7 @@
 </p:sld>
 </file>
 
-<file path=ppt/slides/slide13.xml><?xml version="1.0" encoding="utf-8"?>
+<file path=ppt/slides/slide14.xml><?xml version="1.0" encoding="utf-8"?>
 <p:sld xmlns:a="http://schemas.openxmlformats.org/drawingml/2006/main" xmlns:r="http://schemas.openxmlformats.org/officeDocument/2006/relationships" xmlns:p="http://schemas.openxmlformats.org/presentationml/2006/main">
   <p:cSld>
     <p:spTree>
@@ -23809,13 +24064,8 @@
             <a:pPr algn="ctr"/>
             <a:r>
               <a:rPr lang="en-US" dirty="0"/>
-              <a:t>Meetup </a:t>
+              <a:t>Meetup Members</a:t>
             </a:r>
-            <a:r>
-              <a:rPr lang="en-US" dirty="0" err="1"/>
-              <a:t>Mambers</a:t>
-            </a:r>
-            <a:endParaRPr lang="en-US" dirty="0"/>
           </a:p>
         </p:txBody>
       </p:sp>
@@ -24052,7 +24302,7 @@
 </p:sld>
 </file>
 
-<file path=ppt/slides/slide14.xml><?xml version="1.0" encoding="utf-8"?>
+<file path=ppt/slides/slide15.xml><?xml version="1.0" encoding="utf-8"?>
 <p:sld xmlns:a="http://schemas.openxmlformats.org/drawingml/2006/main" xmlns:r="http://schemas.openxmlformats.org/officeDocument/2006/relationships" xmlns:p="http://schemas.openxmlformats.org/presentationml/2006/main">
   <p:cSld>
     <p:spTree>
@@ -24360,13 +24610,8 @@
             <a:pPr algn="ctr"/>
             <a:r>
               <a:rPr lang="en-US" dirty="0"/>
-              <a:t>Meetup </a:t>
+              <a:t>Meetup Members</a:t>
             </a:r>
-            <a:r>
-              <a:rPr lang="en-US" dirty="0" err="1"/>
-              <a:t>Mambers</a:t>
-            </a:r>
-            <a:endParaRPr lang="en-US" dirty="0"/>
           </a:p>
         </p:txBody>
       </p:sp>
@@ -24713,7 +24958,7 @@
 </p:sld>
 </file>
 
-<file path=ppt/slides/slide15.xml><?xml version="1.0" encoding="utf-8"?>
+<file path=ppt/slides/slide16.xml><?xml version="1.0" encoding="utf-8"?>
 <p:sld xmlns:a="http://schemas.openxmlformats.org/drawingml/2006/main" xmlns:r="http://schemas.openxmlformats.org/officeDocument/2006/relationships" xmlns:p="http://schemas.openxmlformats.org/presentationml/2006/main">
   <p:cSld>
     <p:spTree>
@@ -24873,7 +25118,7 @@
 </p:sld>
 </file>
 
-<file path=ppt/slides/slide16.xml><?xml version="1.0" encoding="utf-8"?>
+<file path=ppt/slides/slide17.xml><?xml version="1.0" encoding="utf-8"?>
 <p:sld xmlns:a="http://schemas.openxmlformats.org/drawingml/2006/main" xmlns:r="http://schemas.openxmlformats.org/officeDocument/2006/relationships" xmlns:p="http://schemas.openxmlformats.org/presentationml/2006/main">
   <p:cSld>
     <p:spTree>
@@ -25001,7 +25246,7 @@
 </p:sld>
 </file>
 
-<file path=ppt/slides/slide17.xml><?xml version="1.0" encoding="utf-8"?>
+<file path=ppt/slides/slide18.xml><?xml version="1.0" encoding="utf-8"?>
 <p:sld xmlns:a="http://schemas.openxmlformats.org/drawingml/2006/main" xmlns:r="http://schemas.openxmlformats.org/officeDocument/2006/relationships" xmlns:p="http://schemas.openxmlformats.org/presentationml/2006/main">
   <p:cSld>
     <p:spTree>
@@ -25069,7 +25314,7 @@
             <p:ph idx="1"/>
             <p:extLst>
               <p:ext uri="{D42A27DB-BD31-4B8C-83A1-F6EECF244321}">
-                <p14:modId xmlns:p14="http://schemas.microsoft.com/office/powerpoint/2010/main" val="1087552194"/>
+                <p14:modId xmlns:p14="http://schemas.microsoft.com/office/powerpoint/2010/main" val="4245185557"/>
               </p:ext>
             </p:extLst>
           </p:nvPr>
@@ -25175,7 +25420,7 @@
 </p:sld>
 </file>
 
-<file path=ppt/slides/slide18.xml><?xml version="1.0" encoding="utf-8"?>
+<file path=ppt/slides/slide19.xml><?xml version="1.0" encoding="utf-8"?>
 <p:sld xmlns:a="http://schemas.openxmlformats.org/drawingml/2006/main" xmlns:r="http://schemas.openxmlformats.org/officeDocument/2006/relationships" xmlns:p="http://schemas.openxmlformats.org/presentationml/2006/main">
   <p:cSld>
     <p:spTree>
@@ -25236,8 +25481,8 @@
         </p:nvSpPr>
         <p:spPr>
           <a:xfrm>
-            <a:off x="584508" y="1619483"/>
-            <a:ext cx="1905000" cy="918697"/>
+            <a:off x="3410493" y="5800738"/>
+            <a:ext cx="1696819" cy="740875"/>
           </a:xfrm>
           <a:prstGeom prst="roundRect">
             <a:avLst/>
@@ -25274,65 +25519,8 @@
           <a:p>
             <a:pPr algn="ctr"/>
             <a:r>
-              <a:rPr lang="en-US" dirty="0"/>
+              <a:rPr lang="en-US" sz="1600" dirty="0"/>
               <a:t>Text 0</a:t>
-            </a:r>
-          </a:p>
-        </p:txBody>
-      </p:sp>
-      <p:sp>
-        <p:nvSpPr>
-          <p:cNvPr id="5" name="Rounded Rectangle 4">
-            <a:extLst>
-              <a:ext uri="{FF2B5EF4-FFF2-40B4-BE49-F238E27FC236}">
-                <a16:creationId xmlns:a16="http://schemas.microsoft.com/office/drawing/2014/main" id="{39B19FB2-04F4-3C4A-8A2F-5EBEC146A36F}"/>
-              </a:ext>
-            </a:extLst>
-          </p:cNvPr>
-          <p:cNvSpPr/>
-          <p:nvPr/>
-        </p:nvSpPr>
-        <p:spPr>
-          <a:xfrm>
-            <a:off x="2685584" y="1597183"/>
-            <a:ext cx="1905000" cy="918697"/>
-          </a:xfrm>
-          <a:prstGeom prst="roundRect">
-            <a:avLst/>
-          </a:prstGeom>
-          <a:solidFill>
-            <a:schemeClr val="accent5">
-              <a:lumMod val="75000"/>
-            </a:schemeClr>
-          </a:solidFill>
-          <a:ln>
-            <a:noFill/>
-          </a:ln>
-        </p:spPr>
-        <p:style>
-          <a:lnRef idx="2">
-            <a:schemeClr val="accent1">
-              <a:shade val="50000"/>
-            </a:schemeClr>
-          </a:lnRef>
-          <a:fillRef idx="1">
-            <a:schemeClr val="accent1"/>
-          </a:fillRef>
-          <a:effectRef idx="0">
-            <a:schemeClr val="accent1"/>
-          </a:effectRef>
-          <a:fontRef idx="minor">
-            <a:schemeClr val="lt1"/>
-          </a:fontRef>
-        </p:style>
-        <p:txBody>
-          <a:bodyPr rtlCol="0" anchor="ctr"/>
-          <a:lstStyle/>
-          <a:p>
-            <a:pPr algn="ctr"/>
-            <a:r>
-              <a:rPr lang="en-US" dirty="0"/>
-              <a:t>Hypertext 1</a:t>
             </a:r>
           </a:p>
         </p:txBody>
@@ -25351,8 +25539,8 @@
         </p:nvSpPr>
         <p:spPr>
           <a:xfrm>
-            <a:off x="4786660" y="1597182"/>
-            <a:ext cx="1905000" cy="918697"/>
+            <a:off x="8275175" y="5699612"/>
+            <a:ext cx="3163747" cy="742714"/>
           </a:xfrm>
           <a:prstGeom prst="roundRect">
             <a:avLst/>
@@ -25389,7 +25577,7 @@
           <a:p>
             <a:pPr algn="ctr"/>
             <a:r>
-              <a:rPr lang="en-US" dirty="0"/>
+              <a:rPr lang="en-US" sz="1600" dirty="0"/>
               <a:t>Text 1</a:t>
             </a:r>
           </a:p>
@@ -25409,124 +25597,8 @@
         </p:nvSpPr>
         <p:spPr>
           <a:xfrm>
-            <a:off x="2685584" y="2686286"/>
-            <a:ext cx="972015" cy="918697"/>
-          </a:xfrm>
-          <a:prstGeom prst="roundRect">
-            <a:avLst/>
-          </a:prstGeom>
-          <a:solidFill>
-            <a:schemeClr val="tx1">
-              <a:lumMod val="50000"/>
-              <a:lumOff val="50000"/>
-            </a:schemeClr>
-          </a:solidFill>
-          <a:ln>
-            <a:noFill/>
-          </a:ln>
-        </p:spPr>
-        <p:style>
-          <a:lnRef idx="2">
-            <a:schemeClr val="accent1">
-              <a:shade val="50000"/>
-            </a:schemeClr>
-          </a:lnRef>
-          <a:fillRef idx="1">
-            <a:schemeClr val="accent1"/>
-          </a:fillRef>
-          <a:effectRef idx="0">
-            <a:schemeClr val="accent1"/>
-          </a:effectRef>
-          <a:fontRef idx="minor">
-            <a:schemeClr val="lt1"/>
-          </a:fontRef>
-        </p:style>
-        <p:txBody>
-          <a:bodyPr rtlCol="0" anchor="ctr"/>
-          <a:lstStyle/>
-          <a:p>
-            <a:pPr algn="ctr"/>
-            <a:r>
-              <a:rPr lang="en-US" dirty="0"/>
-              <a:t>Display Text</a:t>
-            </a:r>
-          </a:p>
-        </p:txBody>
-      </p:sp>
-      <p:sp>
-        <p:nvSpPr>
-          <p:cNvPr id="8" name="Rounded Rectangle 7">
-            <a:extLst>
-              <a:ext uri="{FF2B5EF4-FFF2-40B4-BE49-F238E27FC236}">
-                <a16:creationId xmlns:a16="http://schemas.microsoft.com/office/drawing/2014/main" id="{977C776A-21B1-B24C-8C4C-C1971B329067}"/>
-              </a:ext>
-            </a:extLst>
-          </p:cNvPr>
-          <p:cNvSpPr/>
-          <p:nvPr/>
-        </p:nvSpPr>
-        <p:spPr>
-          <a:xfrm>
-            <a:off x="3814645" y="2686286"/>
-            <a:ext cx="972015" cy="918697"/>
-          </a:xfrm>
-          <a:prstGeom prst="roundRect">
-            <a:avLst/>
-          </a:prstGeom>
-          <a:solidFill>
-            <a:schemeClr val="tx1">
-              <a:lumMod val="50000"/>
-              <a:lumOff val="50000"/>
-            </a:schemeClr>
-          </a:solidFill>
-          <a:ln>
-            <a:noFill/>
-          </a:ln>
-        </p:spPr>
-        <p:style>
-          <a:lnRef idx="2">
-            <a:schemeClr val="accent1">
-              <a:shade val="50000"/>
-            </a:schemeClr>
-          </a:lnRef>
-          <a:fillRef idx="1">
-            <a:schemeClr val="accent1"/>
-          </a:fillRef>
-          <a:effectRef idx="0">
-            <a:schemeClr val="accent1"/>
-          </a:effectRef>
-          <a:fontRef idx="minor">
-            <a:schemeClr val="lt1"/>
-          </a:fontRef>
-        </p:style>
-        <p:txBody>
-          <a:bodyPr rtlCol="0" anchor="ctr"/>
-          <a:lstStyle/>
-          <a:p>
-            <a:pPr algn="ctr"/>
-            <a:r>
-              <a:rPr lang="en-US" dirty="0"/>
-              <a:t>Address</a:t>
-            </a:r>
-          </a:p>
-        </p:txBody>
-      </p:sp>
-      <p:sp>
-        <p:nvSpPr>
-          <p:cNvPr id="9" name="Rounded Rectangle 8">
-            <a:extLst>
-              <a:ext uri="{FF2B5EF4-FFF2-40B4-BE49-F238E27FC236}">
-                <a16:creationId xmlns:a16="http://schemas.microsoft.com/office/drawing/2014/main" id="{8389013E-8854-4C48-91E1-354ABE951CB6}"/>
-              </a:ext>
-            </a:extLst>
-          </p:cNvPr>
-          <p:cNvSpPr/>
-          <p:nvPr/>
-        </p:nvSpPr>
-        <p:spPr>
-          <a:xfrm>
-            <a:off x="6887736" y="1597183"/>
-            <a:ext cx="1905000" cy="918697"/>
+            <a:off x="5323209" y="5826012"/>
+            <a:ext cx="926360" cy="641588"/>
           </a:xfrm>
           <a:prstGeom prst="roundRect">
             <a:avLst/>
@@ -25562,18 +25634,18 @@
           <a:p>
             <a:pPr algn="ctr"/>
             <a:r>
-              <a:rPr lang="en-US" dirty="0"/>
-              <a:t>Hypertext 2</a:t>
+              <a:rPr lang="en-US" sz="1600" dirty="0"/>
+              <a:t>Display Text 1</a:t>
             </a:r>
           </a:p>
         </p:txBody>
       </p:sp>
       <p:sp>
         <p:nvSpPr>
-          <p:cNvPr id="10" name="Rounded Rectangle 9">
+          <p:cNvPr id="8" name="Rounded Rectangle 7">
             <a:extLst>
               <a:ext uri="{FF2B5EF4-FFF2-40B4-BE49-F238E27FC236}">
-                <a16:creationId xmlns:a16="http://schemas.microsoft.com/office/drawing/2014/main" id="{D76330FE-0D75-644A-AFC0-C677B4586B00}"/>
+                <a16:creationId xmlns:a16="http://schemas.microsoft.com/office/drawing/2014/main" id="{977C776A-21B1-B24C-8C4C-C1971B329067}"/>
               </a:ext>
             </a:extLst>
           </p:cNvPr>
@@ -25582,16 +25654,15 @@
         </p:nvSpPr>
         <p:spPr>
           <a:xfrm>
-            <a:off x="8988812" y="1597181"/>
-            <a:ext cx="1905000" cy="918697"/>
+            <a:off x="6414990" y="5800738"/>
+            <a:ext cx="1675714" cy="641588"/>
           </a:xfrm>
           <a:prstGeom prst="roundRect">
             <a:avLst/>
           </a:prstGeom>
           <a:solidFill>
-            <a:schemeClr val="tx1">
-              <a:lumMod val="50000"/>
-              <a:lumOff val="50000"/>
+            <a:schemeClr val="accent5">
+              <a:lumMod val="75000"/>
             </a:schemeClr>
           </a:solidFill>
           <a:ln>
@@ -25620,8 +25691,8 @@
           <a:p>
             <a:pPr algn="ctr"/>
             <a:r>
-              <a:rPr lang="en-US" dirty="0"/>
-              <a:t>Text 2</a:t>
+              <a:rPr lang="en-US" sz="1600" dirty="0"/>
+              <a:t>Link 1</a:t>
             </a:r>
           </a:p>
         </p:txBody>
@@ -25640,7 +25711,7 @@
         </p:nvSpPr>
         <p:spPr>
           <a:xfrm>
-            <a:off x="707171" y="4808653"/>
+            <a:off x="876702" y="1428328"/>
             <a:ext cx="10129025" cy="830997"/>
           </a:xfrm>
           <a:prstGeom prst="rect">
@@ -25691,10 +25762,450 @@
       </p:sp>
       <p:sp>
         <p:nvSpPr>
-          <p:cNvPr id="13" name="TextBox 12">
+          <p:cNvPr id="14" name="Rounded Rectangle 13">
             <a:extLst>
               <a:ext uri="{FF2B5EF4-FFF2-40B4-BE49-F238E27FC236}">
-                <a16:creationId xmlns:a16="http://schemas.microsoft.com/office/drawing/2014/main" id="{92490BF8-27EB-0A47-A9D7-AACB44D1DD16}"/>
+                <a16:creationId xmlns:a16="http://schemas.microsoft.com/office/drawing/2014/main" id="{1E002C6B-A206-554C-AE5A-16EED3DC57E6}"/>
+              </a:ext>
+            </a:extLst>
+          </p:cNvPr>
+          <p:cNvSpPr/>
+          <p:nvPr/>
+        </p:nvSpPr>
+        <p:spPr>
+          <a:xfrm>
+            <a:off x="3291789" y="2551607"/>
+            <a:ext cx="1815523" cy="983251"/>
+          </a:xfrm>
+          <a:prstGeom prst="roundRect">
+            <a:avLst/>
+          </a:prstGeom>
+          <a:solidFill>
+            <a:schemeClr val="tx1">
+              <a:lumMod val="50000"/>
+              <a:lumOff val="50000"/>
+            </a:schemeClr>
+          </a:solidFill>
+          <a:ln>
+            <a:noFill/>
+          </a:ln>
+        </p:spPr>
+        <p:style>
+          <a:lnRef idx="2">
+            <a:schemeClr val="accent1">
+              <a:shade val="50000"/>
+            </a:schemeClr>
+          </a:lnRef>
+          <a:fillRef idx="1">
+            <a:schemeClr val="accent1"/>
+          </a:fillRef>
+          <a:effectRef idx="0">
+            <a:schemeClr val="accent1"/>
+          </a:effectRef>
+          <a:fontRef idx="minor">
+            <a:schemeClr val="lt1"/>
+          </a:fontRef>
+        </p:style>
+        <p:txBody>
+          <a:bodyPr rtlCol="0" anchor="ctr"/>
+          <a:lstStyle/>
+          <a:p>
+            <a:pPr algn="ctr"/>
+            <a:r>
+              <a:rPr lang="en-US" sz="1400" i="1" dirty="0">
+                <a:solidFill>
+                  <a:srgbClr val="222222"/>
+                </a:solidFill>
+                <a:latin typeface="Roboto" panose="02000000000000000000" pitchFamily="2" charset="0"/>
+              </a:rPr>
+              <a:t>We are so thankful for </a:t>
+            </a:r>
+            <a:endParaRPr lang="en-US" sz="1400" dirty="0"/>
+          </a:p>
+        </p:txBody>
+      </p:sp>
+      <p:sp>
+        <p:nvSpPr>
+          <p:cNvPr id="15" name="Rounded Rectangle 14">
+            <a:extLst>
+              <a:ext uri="{FF2B5EF4-FFF2-40B4-BE49-F238E27FC236}">
+                <a16:creationId xmlns:a16="http://schemas.microsoft.com/office/drawing/2014/main" id="{7E6ECB19-CCB6-6D42-A62A-9D2F0917D388}"/>
+              </a:ext>
+            </a:extLst>
+          </p:cNvPr>
+          <p:cNvSpPr/>
+          <p:nvPr/>
+        </p:nvSpPr>
+        <p:spPr>
+          <a:xfrm>
+            <a:off x="5341808" y="2486302"/>
+            <a:ext cx="2648040" cy="1048556"/>
+          </a:xfrm>
+          <a:prstGeom prst="roundRect">
+            <a:avLst/>
+          </a:prstGeom>
+          <a:solidFill>
+            <a:schemeClr val="accent5">
+              <a:lumMod val="75000"/>
+            </a:schemeClr>
+          </a:solidFill>
+          <a:ln>
+            <a:noFill/>
+          </a:ln>
+        </p:spPr>
+        <p:style>
+          <a:lnRef idx="2">
+            <a:schemeClr val="accent1">
+              <a:shade val="50000"/>
+            </a:schemeClr>
+          </a:lnRef>
+          <a:fillRef idx="1">
+            <a:schemeClr val="accent1"/>
+          </a:fillRef>
+          <a:effectRef idx="0">
+            <a:schemeClr val="accent1"/>
+          </a:effectRef>
+          <a:fontRef idx="minor">
+            <a:schemeClr val="lt1"/>
+          </a:fontRef>
+        </p:style>
+        <p:txBody>
+          <a:bodyPr rtlCol="0" anchor="ctr"/>
+          <a:lstStyle/>
+          <a:p>
+            <a:pPr algn="ctr"/>
+            <a:r>
+              <a:rPr lang="en-US" sz="1400" dirty="0"/>
+              <a:t>Kelly</a:t>
+            </a:r>
+          </a:p>
+        </p:txBody>
+      </p:sp>
+      <p:sp>
+        <p:nvSpPr>
+          <p:cNvPr id="16" name="Rounded Rectangle 15">
+            <a:extLst>
+              <a:ext uri="{FF2B5EF4-FFF2-40B4-BE49-F238E27FC236}">
+                <a16:creationId xmlns:a16="http://schemas.microsoft.com/office/drawing/2014/main" id="{F0210173-14F0-F846-AA1F-EFB435727604}"/>
+              </a:ext>
+            </a:extLst>
+          </p:cNvPr>
+          <p:cNvSpPr/>
+          <p:nvPr/>
+        </p:nvSpPr>
+        <p:spPr>
+          <a:xfrm>
+            <a:off x="8275176" y="2480344"/>
+            <a:ext cx="3163747" cy="1062896"/>
+          </a:xfrm>
+          <a:prstGeom prst="roundRect">
+            <a:avLst/>
+          </a:prstGeom>
+          <a:solidFill>
+            <a:schemeClr val="tx1">
+              <a:lumMod val="50000"/>
+              <a:lumOff val="50000"/>
+            </a:schemeClr>
+          </a:solidFill>
+          <a:ln>
+            <a:noFill/>
+          </a:ln>
+        </p:spPr>
+        <p:style>
+          <a:lnRef idx="2">
+            <a:schemeClr val="accent1">
+              <a:shade val="50000"/>
+            </a:schemeClr>
+          </a:lnRef>
+          <a:fillRef idx="1">
+            <a:schemeClr val="accent1"/>
+          </a:fillRef>
+          <a:effectRef idx="0">
+            <a:schemeClr val="accent1"/>
+          </a:effectRef>
+          <a:fontRef idx="minor">
+            <a:schemeClr val="lt1"/>
+          </a:fontRef>
+        </p:style>
+        <p:txBody>
+          <a:bodyPr rtlCol="0" anchor="ctr"/>
+          <a:lstStyle/>
+          <a:p>
+            <a:pPr algn="ctr"/>
+            <a:r>
+              <a:rPr lang="en-US" sz="1400" i="1" dirty="0">
+                <a:solidFill>
+                  <a:srgbClr val="222222"/>
+                </a:solidFill>
+                <a:latin typeface="Roboto" panose="02000000000000000000" pitchFamily="2" charset="0"/>
+              </a:rPr>
+              <a:t>who shared with us her deepest wisdom about our careers at June's monthly meeting</a:t>
+            </a:r>
+            <a:r>
+              <a:rPr lang="en-US" sz="1400" dirty="0"/>
+              <a:t> 1</a:t>
+            </a:r>
+          </a:p>
+        </p:txBody>
+      </p:sp>
+      <p:sp>
+        <p:nvSpPr>
+          <p:cNvPr id="17" name="Rounded Rectangle 16">
+            <a:extLst>
+              <a:ext uri="{FF2B5EF4-FFF2-40B4-BE49-F238E27FC236}">
+                <a16:creationId xmlns:a16="http://schemas.microsoft.com/office/drawing/2014/main" id="{73061000-6C6A-F44A-8198-5E3AC951DD59}"/>
+              </a:ext>
+            </a:extLst>
+          </p:cNvPr>
+          <p:cNvSpPr/>
+          <p:nvPr/>
+        </p:nvSpPr>
+        <p:spPr>
+          <a:xfrm>
+            <a:off x="5323209" y="3680875"/>
+            <a:ext cx="926360" cy="983251"/>
+          </a:xfrm>
+          <a:prstGeom prst="roundRect">
+            <a:avLst/>
+          </a:prstGeom>
+          <a:solidFill>
+            <a:schemeClr val="tx1">
+              <a:lumMod val="50000"/>
+              <a:lumOff val="50000"/>
+            </a:schemeClr>
+          </a:solidFill>
+          <a:ln>
+            <a:noFill/>
+          </a:ln>
+        </p:spPr>
+        <p:style>
+          <a:lnRef idx="2">
+            <a:schemeClr val="accent1">
+              <a:shade val="50000"/>
+            </a:schemeClr>
+          </a:lnRef>
+          <a:fillRef idx="1">
+            <a:schemeClr val="accent1"/>
+          </a:fillRef>
+          <a:effectRef idx="0">
+            <a:schemeClr val="accent1"/>
+          </a:effectRef>
+          <a:fontRef idx="minor">
+            <a:schemeClr val="lt1"/>
+          </a:fontRef>
+        </p:style>
+        <p:txBody>
+          <a:bodyPr rtlCol="0" anchor="ctr"/>
+          <a:lstStyle/>
+          <a:p>
+            <a:pPr algn="ctr"/>
+            <a:r>
+              <a:rPr lang="en-US" sz="1400" dirty="0"/>
+              <a:t>Kelly</a:t>
+            </a:r>
+          </a:p>
+        </p:txBody>
+      </p:sp>
+      <p:sp>
+        <p:nvSpPr>
+          <p:cNvPr id="18" name="Rounded Rectangle 17">
+            <a:extLst>
+              <a:ext uri="{FF2B5EF4-FFF2-40B4-BE49-F238E27FC236}">
+                <a16:creationId xmlns:a16="http://schemas.microsoft.com/office/drawing/2014/main" id="{7DC9BE76-54D7-894C-A6CD-C469490759B9}"/>
+              </a:ext>
+            </a:extLst>
+          </p:cNvPr>
+          <p:cNvSpPr/>
+          <p:nvPr/>
+        </p:nvSpPr>
+        <p:spPr>
+          <a:xfrm>
+            <a:off x="6414990" y="3639119"/>
+            <a:ext cx="1574858" cy="983251"/>
+          </a:xfrm>
+          <a:prstGeom prst="roundRect">
+            <a:avLst/>
+          </a:prstGeom>
+          <a:solidFill>
+            <a:schemeClr val="tx1">
+              <a:lumMod val="50000"/>
+              <a:lumOff val="50000"/>
+            </a:schemeClr>
+          </a:solidFill>
+          <a:ln>
+            <a:noFill/>
+          </a:ln>
+        </p:spPr>
+        <p:style>
+          <a:lnRef idx="2">
+            <a:schemeClr val="accent1">
+              <a:shade val="50000"/>
+            </a:schemeClr>
+          </a:lnRef>
+          <a:fillRef idx="1">
+            <a:schemeClr val="accent1"/>
+          </a:fillRef>
+          <a:effectRef idx="0">
+            <a:schemeClr val="accent1"/>
+          </a:effectRef>
+          <a:fontRef idx="minor">
+            <a:schemeClr val="lt1"/>
+          </a:fontRef>
+        </p:style>
+        <p:txBody>
+          <a:bodyPr rtlCol="0" anchor="ctr"/>
+          <a:lstStyle/>
+          <a:p>
+            <a:pPr algn="ctr"/>
+            <a:r>
+              <a:rPr lang="en-US" sz="1400" dirty="0"/>
+              <a:t>https://</a:t>
+            </a:r>
+            <a:r>
+              <a:rPr lang="en-US" sz="1400" dirty="0" err="1"/>
+              <a:t>www.linkedin.com</a:t>
+            </a:r>
+            <a:r>
+              <a:rPr lang="en-US" sz="1400" dirty="0"/>
+              <a:t>/in/colleen-mccue-phd-13b144115/</a:t>
+            </a:r>
+          </a:p>
+        </p:txBody>
+      </p:sp>
+      <p:sp>
+        <p:nvSpPr>
+          <p:cNvPr id="21" name="Rounded Rectangle 20">
+            <a:extLst>
+              <a:ext uri="{FF2B5EF4-FFF2-40B4-BE49-F238E27FC236}">
+                <a16:creationId xmlns:a16="http://schemas.microsoft.com/office/drawing/2014/main" id="{87D1F235-A926-D143-A497-BBEC661C51CE}"/>
+              </a:ext>
+            </a:extLst>
+          </p:cNvPr>
+          <p:cNvSpPr/>
+          <p:nvPr/>
+        </p:nvSpPr>
+        <p:spPr>
+          <a:xfrm>
+            <a:off x="1775225" y="2557064"/>
+            <a:ext cx="1282067" cy="977794"/>
+          </a:xfrm>
+          <a:prstGeom prst="roundRect">
+            <a:avLst/>
+          </a:prstGeom>
+          <a:solidFill>
+            <a:schemeClr val="accent1">
+              <a:lumMod val="20000"/>
+              <a:lumOff val="80000"/>
+            </a:schemeClr>
+          </a:solidFill>
+          <a:ln>
+            <a:noFill/>
+          </a:ln>
+        </p:spPr>
+        <p:style>
+          <a:lnRef idx="2">
+            <a:schemeClr val="accent1">
+              <a:shade val="50000"/>
+            </a:schemeClr>
+          </a:lnRef>
+          <a:fillRef idx="1">
+            <a:schemeClr val="accent1"/>
+          </a:fillRef>
+          <a:effectRef idx="0">
+            <a:schemeClr val="accent1"/>
+          </a:effectRef>
+          <a:fontRef idx="minor">
+            <a:schemeClr val="lt1"/>
+          </a:fontRef>
+        </p:style>
+        <p:txBody>
+          <a:bodyPr rtlCol="0" anchor="ctr"/>
+          <a:lstStyle/>
+          <a:p>
+            <a:pPr algn="ctr"/>
+            <a:r>
+              <a:rPr lang="en-US" sz="1400" i="1" dirty="0">
+                <a:solidFill>
+                  <a:srgbClr val="222222"/>
+                </a:solidFill>
+                <a:latin typeface="Roboto" panose="02000000000000000000" pitchFamily="2" charset="0"/>
+              </a:rPr>
+              <a:t>Thankful</a:t>
+            </a:r>
+            <a:endParaRPr lang="en-US" sz="1400" dirty="0"/>
+          </a:p>
+        </p:txBody>
+      </p:sp>
+      <p:sp>
+        <p:nvSpPr>
+          <p:cNvPr id="22" name="Rounded Rectangle 21">
+            <a:extLst>
+              <a:ext uri="{FF2B5EF4-FFF2-40B4-BE49-F238E27FC236}">
+                <a16:creationId xmlns:a16="http://schemas.microsoft.com/office/drawing/2014/main" id="{872061DF-F7D6-AD4B-B438-233F55E27C1A}"/>
+              </a:ext>
+            </a:extLst>
+          </p:cNvPr>
+          <p:cNvSpPr/>
+          <p:nvPr/>
+        </p:nvSpPr>
+        <p:spPr>
+          <a:xfrm>
+            <a:off x="1746380" y="5800738"/>
+            <a:ext cx="1310912" cy="692137"/>
+          </a:xfrm>
+          <a:prstGeom prst="roundRect">
+            <a:avLst/>
+          </a:prstGeom>
+          <a:solidFill>
+            <a:schemeClr val="accent1">
+              <a:lumMod val="20000"/>
+              <a:lumOff val="80000"/>
+            </a:schemeClr>
+          </a:solidFill>
+          <a:ln>
+            <a:noFill/>
+          </a:ln>
+        </p:spPr>
+        <p:style>
+          <a:lnRef idx="2">
+            <a:schemeClr val="accent1">
+              <a:shade val="50000"/>
+            </a:schemeClr>
+          </a:lnRef>
+          <a:fillRef idx="1">
+            <a:schemeClr val="accent1"/>
+          </a:fillRef>
+          <a:effectRef idx="0">
+            <a:schemeClr val="accent1"/>
+          </a:effectRef>
+          <a:fontRef idx="minor">
+            <a:schemeClr val="lt1"/>
+          </a:fontRef>
+        </p:style>
+        <p:txBody>
+          <a:bodyPr rtlCol="0" anchor="ctr"/>
+          <a:lstStyle/>
+          <a:p>
+            <a:pPr algn="ctr"/>
+            <a:r>
+              <a:rPr lang="en-US" sz="1600" i="1" dirty="0">
+                <a:solidFill>
+                  <a:srgbClr val="222222"/>
+                </a:solidFill>
+                <a:latin typeface="Roboto" panose="02000000000000000000" pitchFamily="2" charset="0"/>
+              </a:rPr>
+              <a:t>Heading</a:t>
+            </a:r>
+            <a:endParaRPr lang="en-US" sz="1600" dirty="0"/>
+          </a:p>
+        </p:txBody>
+      </p:sp>
+      <p:sp>
+        <p:nvSpPr>
+          <p:cNvPr id="20" name="TextBox 19">
+            <a:extLst>
+              <a:ext uri="{FF2B5EF4-FFF2-40B4-BE49-F238E27FC236}">
+                <a16:creationId xmlns:a16="http://schemas.microsoft.com/office/drawing/2014/main" id="{7D7A7188-6A76-A744-B2B2-B7A5BDDD78A2}"/>
               </a:ext>
             </a:extLst>
           </p:cNvPr>
@@ -25703,8 +26214,8 @@
         </p:nvSpPr>
         <p:spPr>
           <a:xfrm>
-            <a:off x="764787" y="4338309"/>
-            <a:ext cx="10129025" cy="461665"/>
+            <a:off x="1108349" y="5245006"/>
+            <a:ext cx="6094070" cy="369332"/>
           </a:xfrm>
           <a:prstGeom prst="rect">
             <a:avLst/>
@@ -25717,37 +26228,16 @@
           </a:bodyPr>
           <a:lstStyle/>
           <a:p>
-            <a:pPr algn="l"/>
             <a:r>
-              <a:rPr lang="en-US" sz="2400" b="0" dirty="0">
+              <a:rPr lang="en-US" dirty="0">
                 <a:solidFill>
                   <a:srgbClr val="222222"/>
                 </a:solidFill>
-                <a:effectLst/>
                 <a:latin typeface="Roboto" panose="02000000000000000000" pitchFamily="2" charset="0"/>
               </a:rPr>
-              <a:t>Example with Text 0, </a:t>
+              <a:t>Data Labels/Columns/Fields</a:t>
             </a:r>
-            <a:r>
-              <a:rPr lang="en-US" sz="2400" b="0" dirty="0" err="1">
-                <a:solidFill>
-                  <a:srgbClr val="222222"/>
-                </a:solidFill>
-                <a:effectLst/>
-                <a:latin typeface="Roboto" panose="02000000000000000000" pitchFamily="2" charset="0"/>
-              </a:rPr>
-              <a:t>HyperText</a:t>
-            </a:r>
-            <a:r>
-              <a:rPr lang="en-US" sz="2400" b="0" dirty="0">
-                <a:solidFill>
-                  <a:srgbClr val="222222"/>
-                </a:solidFill>
-                <a:effectLst/>
-                <a:latin typeface="Roboto" panose="02000000000000000000" pitchFamily="2" charset="0"/>
-              </a:rPr>
-              <a:t> 1, and Text 1. </a:t>
-            </a:r>
+            <a:endParaRPr lang="en-US" dirty="0"/>
           </a:p>
         </p:txBody>
       </p:sp>
@@ -25755,212 +26245,6 @@
     <p:extLst>
       <p:ext uri="{BB962C8B-B14F-4D97-AF65-F5344CB8AC3E}">
         <p14:creationId xmlns:p14="http://schemas.microsoft.com/office/powerpoint/2010/main" val="3828967526"/>
-      </p:ext>
-    </p:extLst>
-  </p:cSld>
-  <p:clrMapOvr>
-    <a:masterClrMapping/>
-  </p:clrMapOvr>
-</p:sld>
-</file>
-
-<file path=ppt/slides/slide19.xml><?xml version="1.0" encoding="utf-8"?>
-<p:sld xmlns:a="http://schemas.openxmlformats.org/drawingml/2006/main" xmlns:r="http://schemas.openxmlformats.org/officeDocument/2006/relationships" xmlns:p="http://schemas.openxmlformats.org/presentationml/2006/main">
-  <p:cSld>
-    <p:spTree>
-      <p:nvGrpSpPr>
-        <p:cNvPr id="1" name=""/>
-        <p:cNvGrpSpPr/>
-        <p:nvPr/>
-      </p:nvGrpSpPr>
-      <p:grpSpPr>
-        <a:xfrm>
-          <a:off x="0" y="0"/>
-          <a:ext cx="0" cy="0"/>
-          <a:chOff x="0" y="0"/>
-          <a:chExt cx="0" cy="0"/>
-        </a:xfrm>
-      </p:grpSpPr>
-      <p:sp>
-        <p:nvSpPr>
-          <p:cNvPr id="2" name="Title 1">
-            <a:extLst>
-              <a:ext uri="{FF2B5EF4-FFF2-40B4-BE49-F238E27FC236}">
-                <a16:creationId xmlns:a16="http://schemas.microsoft.com/office/drawing/2014/main" id="{E62D28CA-750F-DC4A-9AD1-B49328019E86}"/>
-              </a:ext>
-            </a:extLst>
-          </p:cNvPr>
-          <p:cNvSpPr>
-            <a:spLocks noGrp="1"/>
-          </p:cNvSpPr>
-          <p:nvPr>
-            <p:ph type="title"/>
-          </p:nvPr>
-        </p:nvSpPr>
-        <p:spPr/>
-        <p:txBody>
-          <a:bodyPr/>
-          <a:lstStyle/>
-          <a:p>
-            <a:r>
-              <a:rPr lang="en-US" dirty="0">
-                <a:latin typeface="Optima" panose="02000503060000020004" pitchFamily="2" charset="0"/>
-              </a:rPr>
-              <a:t>The Three Dreams</a:t>
-            </a:r>
-          </a:p>
-        </p:txBody>
-      </p:sp>
-      <p:sp>
-        <p:nvSpPr>
-          <p:cNvPr id="3" name="Content Placeholder 2">
-            <a:extLst>
-              <a:ext uri="{FF2B5EF4-FFF2-40B4-BE49-F238E27FC236}">
-                <a16:creationId xmlns:a16="http://schemas.microsoft.com/office/drawing/2014/main" id="{DDC1441E-DAC3-5C4A-A7B3-15B0B9097647}"/>
-              </a:ext>
-            </a:extLst>
-          </p:cNvPr>
-          <p:cNvSpPr>
-            <a:spLocks noGrp="1"/>
-          </p:cNvSpPr>
-          <p:nvPr>
-            <p:ph idx="1"/>
-          </p:nvPr>
-        </p:nvSpPr>
-        <p:spPr/>
-        <p:txBody>
-          <a:bodyPr/>
-          <a:lstStyle/>
-          <a:p>
-            <a:r>
-              <a:rPr lang="en-US" dirty="0">
-                <a:latin typeface="Optima" panose="02000503060000020004" pitchFamily="2" charset="0"/>
-              </a:rPr>
-              <a:t>Clustering</a:t>
-            </a:r>
-          </a:p>
-          <a:p>
-            <a:pPr lvl="1"/>
-            <a:r>
-              <a:rPr lang="en-US" sz="1200" dirty="0">
-                <a:latin typeface="Optima" panose="02000503060000020004" pitchFamily="2" charset="0"/>
-              </a:rPr>
-              <a:t>Referrals</a:t>
-            </a:r>
-          </a:p>
-          <a:p>
-            <a:pPr lvl="1"/>
-            <a:r>
-              <a:rPr lang="en-US" sz="1200" dirty="0">
-                <a:latin typeface="Optima" panose="02000503060000020004" pitchFamily="2" charset="0"/>
-              </a:rPr>
-              <a:t>Mentor/Mentee</a:t>
-            </a:r>
-          </a:p>
-          <a:p>
-            <a:pPr lvl="1"/>
-            <a:r>
-              <a:rPr lang="en-US" sz="1200" dirty="0">
-                <a:latin typeface="Optima" panose="02000503060000020004" pitchFamily="2" charset="0"/>
-              </a:rPr>
-              <a:t>Recommendations</a:t>
-            </a:r>
-          </a:p>
-          <a:p>
-            <a:pPr lvl="1"/>
-            <a:r>
-              <a:rPr lang="en-US" sz="1200" dirty="0">
-                <a:latin typeface="Optima" panose="02000503060000020004" pitchFamily="2" charset="0"/>
-              </a:rPr>
-              <a:t>Engagement</a:t>
-            </a:r>
-          </a:p>
-          <a:p>
-            <a:pPr marL="457200" lvl="1" indent="0">
-              <a:buNone/>
-            </a:pPr>
-            <a:endParaRPr lang="en-US" dirty="0">
-              <a:latin typeface="Optima" panose="02000503060000020004" pitchFamily="2" charset="0"/>
-            </a:endParaRPr>
-          </a:p>
-          <a:p>
-            <a:r>
-              <a:rPr lang="en-US" dirty="0">
-                <a:latin typeface="Optima" panose="02000503060000020004" pitchFamily="2" charset="0"/>
-              </a:rPr>
-              <a:t>Predictive Analytics/Machine Learning</a:t>
-            </a:r>
-          </a:p>
-          <a:p>
-            <a:pPr lvl="1"/>
-            <a:r>
-              <a:rPr lang="en-US" sz="1200" dirty="0">
-                <a:latin typeface="Optima" panose="02000503060000020004" pitchFamily="2" charset="0"/>
-              </a:rPr>
-              <a:t>Can we predict relationship building/group advancement</a:t>
-            </a:r>
-          </a:p>
-          <a:p>
-            <a:pPr lvl="1"/>
-            <a:r>
-              <a:rPr lang="en-US" sz="1200" dirty="0">
-                <a:latin typeface="Optima" panose="02000503060000020004" pitchFamily="2" charset="0"/>
-              </a:rPr>
-              <a:t>Can we predict career advance?</a:t>
-            </a:r>
-          </a:p>
-          <a:p>
-            <a:pPr lvl="1"/>
-            <a:r>
-              <a:rPr lang="en-US" sz="1200" dirty="0">
-                <a:latin typeface="Optima" panose="02000503060000020004" pitchFamily="2" charset="0"/>
-              </a:rPr>
-              <a:t>Does our program make a difference?</a:t>
-            </a:r>
-          </a:p>
-          <a:p>
-            <a:pPr marL="457200" lvl="1" indent="0">
-              <a:buNone/>
-            </a:pPr>
-            <a:endParaRPr lang="en-US" sz="1200" dirty="0">
-              <a:latin typeface="Optima" panose="02000503060000020004" pitchFamily="2" charset="0"/>
-            </a:endParaRPr>
-          </a:p>
-          <a:p>
-            <a:r>
-              <a:rPr lang="en-US" dirty="0">
-                <a:latin typeface="Optima" panose="02000503060000020004" pitchFamily="2" charset="0"/>
-              </a:rPr>
-              <a:t>Sharing Our Method</a:t>
-            </a:r>
-            <a:endParaRPr lang="en-US" sz="1200" dirty="0">
-              <a:latin typeface="Optima" panose="02000503060000020004" pitchFamily="2" charset="0"/>
-            </a:endParaRPr>
-          </a:p>
-          <a:p>
-            <a:pPr lvl="1"/>
-            <a:r>
-              <a:rPr lang="en-US" sz="1200" dirty="0">
-                <a:latin typeface="Optima" panose="02000503060000020004" pitchFamily="2" charset="0"/>
-              </a:rPr>
-              <a:t>Can we share all this will other women’s tech groups</a:t>
-            </a:r>
-          </a:p>
-          <a:p>
-            <a:pPr lvl="1"/>
-            <a:r>
-              <a:rPr lang="en-US" sz="1200" dirty="0">
-                <a:latin typeface="Optima" panose="02000503060000020004" pitchFamily="2" charset="0"/>
-              </a:rPr>
-              <a:t>Can we share this with other women’s groups</a:t>
-            </a:r>
-          </a:p>
-        </p:txBody>
-      </p:sp>
-    </p:spTree>
-    <p:extLst>
-      <p:ext uri="{BB962C8B-B14F-4D97-AF65-F5344CB8AC3E}">
-        <p14:creationId xmlns:p14="http://schemas.microsoft.com/office/powerpoint/2010/main" val="3754706164"/>
       </p:ext>
     </p:extLst>
   </p:cSld>
@@ -26231,6 +26515,212 @@
 </file>
 
 <file path=ppt/slides/slide20.xml><?xml version="1.0" encoding="utf-8"?>
+<p:sld xmlns:a="http://schemas.openxmlformats.org/drawingml/2006/main" xmlns:r="http://schemas.openxmlformats.org/officeDocument/2006/relationships" xmlns:p="http://schemas.openxmlformats.org/presentationml/2006/main">
+  <p:cSld>
+    <p:spTree>
+      <p:nvGrpSpPr>
+        <p:cNvPr id="1" name=""/>
+        <p:cNvGrpSpPr/>
+        <p:nvPr/>
+      </p:nvGrpSpPr>
+      <p:grpSpPr>
+        <a:xfrm>
+          <a:off x="0" y="0"/>
+          <a:ext cx="0" cy="0"/>
+          <a:chOff x="0" y="0"/>
+          <a:chExt cx="0" cy="0"/>
+        </a:xfrm>
+      </p:grpSpPr>
+      <p:sp>
+        <p:nvSpPr>
+          <p:cNvPr id="2" name="Title 1">
+            <a:extLst>
+              <a:ext uri="{FF2B5EF4-FFF2-40B4-BE49-F238E27FC236}">
+                <a16:creationId xmlns:a16="http://schemas.microsoft.com/office/drawing/2014/main" id="{E62D28CA-750F-DC4A-9AD1-B49328019E86}"/>
+              </a:ext>
+            </a:extLst>
+          </p:cNvPr>
+          <p:cNvSpPr>
+            <a:spLocks noGrp="1"/>
+          </p:cNvSpPr>
+          <p:nvPr>
+            <p:ph type="title"/>
+          </p:nvPr>
+        </p:nvSpPr>
+        <p:spPr/>
+        <p:txBody>
+          <a:bodyPr/>
+          <a:lstStyle/>
+          <a:p>
+            <a:r>
+              <a:rPr lang="en-US" dirty="0">
+                <a:latin typeface="Optima" panose="02000503060000020004" pitchFamily="2" charset="0"/>
+              </a:rPr>
+              <a:t>The Three Dreams (No Timeline)</a:t>
+            </a:r>
+          </a:p>
+        </p:txBody>
+      </p:sp>
+      <p:sp>
+        <p:nvSpPr>
+          <p:cNvPr id="3" name="Content Placeholder 2">
+            <a:extLst>
+              <a:ext uri="{FF2B5EF4-FFF2-40B4-BE49-F238E27FC236}">
+                <a16:creationId xmlns:a16="http://schemas.microsoft.com/office/drawing/2014/main" id="{DDC1441E-DAC3-5C4A-A7B3-15B0B9097647}"/>
+              </a:ext>
+            </a:extLst>
+          </p:cNvPr>
+          <p:cNvSpPr>
+            <a:spLocks noGrp="1"/>
+          </p:cNvSpPr>
+          <p:nvPr>
+            <p:ph idx="1"/>
+          </p:nvPr>
+        </p:nvSpPr>
+        <p:spPr/>
+        <p:txBody>
+          <a:bodyPr/>
+          <a:lstStyle/>
+          <a:p>
+            <a:r>
+              <a:rPr lang="en-US" dirty="0">
+                <a:latin typeface="Optima" panose="02000503060000020004" pitchFamily="2" charset="0"/>
+              </a:rPr>
+              <a:t>Clustering</a:t>
+            </a:r>
+          </a:p>
+          <a:p>
+            <a:pPr lvl="1"/>
+            <a:r>
+              <a:rPr lang="en-US" sz="1200" dirty="0">
+                <a:latin typeface="Optima" panose="02000503060000020004" pitchFamily="2" charset="0"/>
+              </a:rPr>
+              <a:t>Referrals</a:t>
+            </a:r>
+          </a:p>
+          <a:p>
+            <a:pPr lvl="1"/>
+            <a:r>
+              <a:rPr lang="en-US" sz="1200" dirty="0">
+                <a:latin typeface="Optima" panose="02000503060000020004" pitchFamily="2" charset="0"/>
+              </a:rPr>
+              <a:t>Mentor/Mentee</a:t>
+            </a:r>
+          </a:p>
+          <a:p>
+            <a:pPr lvl="1"/>
+            <a:r>
+              <a:rPr lang="en-US" sz="1200" dirty="0">
+                <a:latin typeface="Optima" panose="02000503060000020004" pitchFamily="2" charset="0"/>
+              </a:rPr>
+              <a:t>Recommendations</a:t>
+            </a:r>
+          </a:p>
+          <a:p>
+            <a:pPr lvl="1"/>
+            <a:r>
+              <a:rPr lang="en-US" sz="1200" dirty="0">
+                <a:latin typeface="Optima" panose="02000503060000020004" pitchFamily="2" charset="0"/>
+              </a:rPr>
+              <a:t>Engagement</a:t>
+            </a:r>
+          </a:p>
+          <a:p>
+            <a:pPr marL="457200" lvl="1" indent="0">
+              <a:buNone/>
+            </a:pPr>
+            <a:endParaRPr lang="en-US" dirty="0">
+              <a:latin typeface="Optima" panose="02000503060000020004" pitchFamily="2" charset="0"/>
+            </a:endParaRPr>
+          </a:p>
+          <a:p>
+            <a:r>
+              <a:rPr lang="en-US" dirty="0">
+                <a:latin typeface="Optima" panose="02000503060000020004" pitchFamily="2" charset="0"/>
+              </a:rPr>
+              <a:t>Predictive Analytics/Machine Learning</a:t>
+            </a:r>
+          </a:p>
+          <a:p>
+            <a:pPr lvl="1"/>
+            <a:r>
+              <a:rPr lang="en-US" sz="1200" dirty="0">
+                <a:latin typeface="Optima" panose="02000503060000020004" pitchFamily="2" charset="0"/>
+              </a:rPr>
+              <a:t>Can we predict relationship building/group advancement</a:t>
+            </a:r>
+          </a:p>
+          <a:p>
+            <a:pPr lvl="1"/>
+            <a:r>
+              <a:rPr lang="en-US" sz="1200" dirty="0">
+                <a:latin typeface="Optima" panose="02000503060000020004" pitchFamily="2" charset="0"/>
+              </a:rPr>
+              <a:t>Can we predict career advance?</a:t>
+            </a:r>
+          </a:p>
+          <a:p>
+            <a:pPr lvl="1"/>
+            <a:r>
+              <a:rPr lang="en-US" sz="1200" dirty="0">
+                <a:latin typeface="Optima" panose="02000503060000020004" pitchFamily="2" charset="0"/>
+              </a:rPr>
+              <a:t>Does our program make a difference?</a:t>
+            </a:r>
+          </a:p>
+          <a:p>
+            <a:pPr marL="457200" lvl="1" indent="0">
+              <a:buNone/>
+            </a:pPr>
+            <a:endParaRPr lang="en-US" sz="1200" dirty="0">
+              <a:latin typeface="Optima" panose="02000503060000020004" pitchFamily="2" charset="0"/>
+            </a:endParaRPr>
+          </a:p>
+          <a:p>
+            <a:r>
+              <a:rPr lang="en-US" dirty="0">
+                <a:latin typeface="Optima" panose="02000503060000020004" pitchFamily="2" charset="0"/>
+              </a:rPr>
+              <a:t>Sharing Our Method</a:t>
+            </a:r>
+            <a:endParaRPr lang="en-US" sz="1200" dirty="0">
+              <a:latin typeface="Optima" panose="02000503060000020004" pitchFamily="2" charset="0"/>
+            </a:endParaRPr>
+          </a:p>
+          <a:p>
+            <a:pPr lvl="1"/>
+            <a:r>
+              <a:rPr lang="en-US" sz="1200" dirty="0">
+                <a:latin typeface="Optima" panose="02000503060000020004" pitchFamily="2" charset="0"/>
+              </a:rPr>
+              <a:t>Can we share all this will other women’s tech groups</a:t>
+            </a:r>
+          </a:p>
+          <a:p>
+            <a:pPr lvl="1"/>
+            <a:r>
+              <a:rPr lang="en-US" sz="1200" dirty="0">
+                <a:latin typeface="Optima" panose="02000503060000020004" pitchFamily="2" charset="0"/>
+              </a:rPr>
+              <a:t>Can we share this with other women’s groups</a:t>
+            </a:r>
+          </a:p>
+        </p:txBody>
+      </p:sp>
+    </p:spTree>
+    <p:extLst>
+      <p:ext uri="{BB962C8B-B14F-4D97-AF65-F5344CB8AC3E}">
+        <p14:creationId xmlns:p14="http://schemas.microsoft.com/office/powerpoint/2010/main" val="3754706164"/>
+      </p:ext>
+    </p:extLst>
+  </p:cSld>
+  <p:clrMapOvr>
+    <a:masterClrMapping/>
+  </p:clrMapOvr>
+</p:sld>
+</file>
+
+<file path=ppt/slides/slide21.xml><?xml version="1.0" encoding="utf-8"?>
 <p:sld xmlns:a="http://schemas.openxmlformats.org/drawingml/2006/main" xmlns:r="http://schemas.openxmlformats.org/officeDocument/2006/relationships" xmlns:p="http://schemas.openxmlformats.org/presentationml/2006/main">
   <p:cSld>
     <p:spTree>
@@ -27301,7 +27791,7 @@
 </p:sld>
 </file>
 
-<file path=ppt/slides/slide21.xml><?xml version="1.0" encoding="utf-8"?>
+<file path=ppt/slides/slide22.xml><?xml version="1.0" encoding="utf-8"?>
 <p:sld xmlns:a="http://schemas.openxmlformats.org/drawingml/2006/main" xmlns:r="http://schemas.openxmlformats.org/officeDocument/2006/relationships" xmlns:p="http://schemas.openxmlformats.org/presentationml/2006/main">
   <p:cSld>
     <p:spTree>
@@ -27402,13 +27892,25 @@
               <a:rPr lang="en-US" dirty="0">
                 <a:latin typeface="Optima" panose="02000503060000020004" pitchFamily="2" charset="0"/>
               </a:rPr>
-              <a:t>See you November 15</a:t>
+              <a:t>See you November </a:t>
+            </a:r>
+            <a:r>
+              <a:rPr lang="en-US" b="1" dirty="0">
+                <a:latin typeface="Optima" panose="02000503060000020004" pitchFamily="2" charset="0"/>
+              </a:rPr>
+              <a:t>17</a:t>
+            </a:r>
+            <a:r>
+              <a:rPr lang="en-US" b="1" baseline="30000" dirty="0">
+                <a:latin typeface="Optima" panose="02000503060000020004" pitchFamily="2" charset="0"/>
+              </a:rPr>
+              <a:t>th</a:t>
             </a:r>
             <a:r>
               <a:rPr lang="en-US" baseline="30000" dirty="0">
                 <a:latin typeface="Optima" panose="02000503060000020004" pitchFamily="2" charset="0"/>
               </a:rPr>
-              <a:t>th </a:t>
+              <a:t> </a:t>
             </a:r>
             <a:r>
               <a:rPr lang="en-US" dirty="0">
@@ -27498,7 +28000,7 @@
 </p:sld>
 </file>
 
-<file path=ppt/slides/slide22.xml><?xml version="1.0" encoding="utf-8"?>
+<file path=ppt/slides/slide23.xml><?xml version="1.0" encoding="utf-8"?>
 <p:sld xmlns:a="http://schemas.openxmlformats.org/drawingml/2006/main" xmlns:r="http://schemas.openxmlformats.org/officeDocument/2006/relationships" xmlns:p="http://schemas.openxmlformats.org/presentationml/2006/main">
   <p:cSld>
     <p:spTree>
@@ -27683,7 +28185,7 @@
 </p:sld>
 </file>
 
-<file path=ppt/slides/slide23.xml><?xml version="1.0" encoding="utf-8"?>
+<file path=ppt/slides/slide24.xml><?xml version="1.0" encoding="utf-8"?>
 <p:sld xmlns:a="http://schemas.openxmlformats.org/drawingml/2006/main" xmlns:r="http://schemas.openxmlformats.org/officeDocument/2006/relationships" xmlns:p="http://schemas.openxmlformats.org/presentationml/2006/main">
   <p:cSld>
     <p:spTree>
@@ -28638,17 +29140,14 @@
               <a:rPr lang="en-US" dirty="0">
                 <a:latin typeface="Optima" panose="02000503060000020004" pitchFamily="2" charset="0"/>
               </a:rPr>
-              <a:t>Welcome </a:t>
+              <a:t>Welcome</a:t>
             </a:r>
-            <a:r>
-              <a:rPr lang="en-US" b="1" dirty="0">
-                <a:solidFill>
-                  <a:schemeClr val="accent1"/>
-                </a:solidFill>
-                <a:latin typeface="Optima" panose="02000503060000020004" pitchFamily="2" charset="0"/>
-              </a:rPr>
-              <a:t>Future Presidents</a:t>
-            </a:r>
+            <a:endParaRPr lang="en-US" b="1" dirty="0">
+              <a:solidFill>
+                <a:schemeClr val="accent1"/>
+              </a:solidFill>
+              <a:latin typeface="Optima" panose="02000503060000020004" pitchFamily="2" charset="0"/>
+            </a:endParaRPr>
           </a:p>
           <a:p>
             <a:r>
@@ -28960,6 +29459,93 @@
       </p:grpSpPr>
       <p:sp>
         <p:nvSpPr>
+          <p:cNvPr id="9" name="Title 8">
+            <a:extLst>
+              <a:ext uri="{FF2B5EF4-FFF2-40B4-BE49-F238E27FC236}">
+                <a16:creationId xmlns:a16="http://schemas.microsoft.com/office/drawing/2014/main" id="{C51F8A78-6069-3D4C-93D2-5432C411F261}"/>
+              </a:ext>
+            </a:extLst>
+          </p:cNvPr>
+          <p:cNvSpPr>
+            <a:spLocks noGrp="1"/>
+          </p:cNvSpPr>
+          <p:nvPr>
+            <p:ph type="title"/>
+          </p:nvPr>
+        </p:nvSpPr>
+        <p:spPr/>
+        <p:txBody>
+          <a:bodyPr/>
+          <a:lstStyle/>
+          <a:p>
+            <a:r>
+              <a:rPr lang="en-US" dirty="0">
+                <a:latin typeface="Optima" panose="02000503060000020004" pitchFamily="2" charset="0"/>
+              </a:rPr>
+              <a:t>Reminder: Different people need different things</a:t>
+            </a:r>
+          </a:p>
+        </p:txBody>
+      </p:sp>
+      <p:sp>
+        <p:nvSpPr>
+          <p:cNvPr id="10" name="Text Placeholder 9">
+            <a:extLst>
+              <a:ext uri="{FF2B5EF4-FFF2-40B4-BE49-F238E27FC236}">
+                <a16:creationId xmlns:a16="http://schemas.microsoft.com/office/drawing/2014/main" id="{9AB61637-8204-C849-B469-6CA54B21B416}"/>
+              </a:ext>
+            </a:extLst>
+          </p:cNvPr>
+          <p:cNvSpPr>
+            <a:spLocks noGrp="1"/>
+          </p:cNvSpPr>
+          <p:nvPr>
+            <p:ph type="body" idx="1"/>
+          </p:nvPr>
+        </p:nvSpPr>
+        <p:spPr/>
+        <p:txBody>
+          <a:bodyPr/>
+          <a:lstStyle/>
+          <a:p>
+            <a:endParaRPr lang="en-US">
+              <a:latin typeface="Optima" panose="02000503060000020004" pitchFamily="2" charset="0"/>
+            </a:endParaRPr>
+          </a:p>
+        </p:txBody>
+      </p:sp>
+    </p:spTree>
+    <p:extLst>
+      <p:ext uri="{BB962C8B-B14F-4D97-AF65-F5344CB8AC3E}">
+        <p14:creationId xmlns:p14="http://schemas.microsoft.com/office/powerpoint/2010/main" val="3626956516"/>
+      </p:ext>
+    </p:extLst>
+  </p:cSld>
+  <p:clrMapOvr>
+    <a:masterClrMapping/>
+  </p:clrMapOvr>
+</p:sld>
+</file>
+
+<file path=ppt/slides/slide9.xml><?xml version="1.0" encoding="utf-8"?>
+<p:sld xmlns:a="http://schemas.openxmlformats.org/drawingml/2006/main" xmlns:r="http://schemas.openxmlformats.org/officeDocument/2006/relationships" xmlns:p="http://schemas.openxmlformats.org/presentationml/2006/main">
+  <p:cSld>
+    <p:spTree>
+      <p:nvGrpSpPr>
+        <p:cNvPr id="1" name=""/>
+        <p:cNvGrpSpPr/>
+        <p:nvPr/>
+      </p:nvGrpSpPr>
+      <p:grpSpPr>
+        <a:xfrm>
+          <a:off x="0" y="0"/>
+          <a:ext cx="0" cy="0"/>
+          <a:chOff x="0" y="0"/>
+          <a:chExt cx="0" cy="0"/>
+        </a:xfrm>
+      </p:grpSpPr>
+      <p:sp>
+        <p:nvSpPr>
           <p:cNvPr id="2" name="Title 1">
             <a:extLst>
               <a:ext uri="{FF2B5EF4-FFF2-40B4-BE49-F238E27FC236}">
@@ -29053,260 +29639,6 @@
     <p:extLst>
       <p:ext uri="{BB962C8B-B14F-4D97-AF65-F5344CB8AC3E}">
         <p14:creationId xmlns:p14="http://schemas.microsoft.com/office/powerpoint/2010/main" val="1345916252"/>
-      </p:ext>
-    </p:extLst>
-  </p:cSld>
-  <p:clrMapOvr>
-    <a:masterClrMapping/>
-  </p:clrMapOvr>
-</p:sld>
-</file>
-
-<file path=ppt/slides/slide9.xml><?xml version="1.0" encoding="utf-8"?>
-<p:sld xmlns:a="http://schemas.openxmlformats.org/drawingml/2006/main" xmlns:r="http://schemas.openxmlformats.org/officeDocument/2006/relationships" xmlns:p="http://schemas.openxmlformats.org/presentationml/2006/main">
-  <p:cSld>
-    <p:spTree>
-      <p:nvGrpSpPr>
-        <p:cNvPr id="1" name=""/>
-        <p:cNvGrpSpPr/>
-        <p:nvPr/>
-      </p:nvGrpSpPr>
-      <p:grpSpPr>
-        <a:xfrm>
-          <a:off x="0" y="0"/>
-          <a:ext cx="0" cy="0"/>
-          <a:chOff x="0" y="0"/>
-          <a:chExt cx="0" cy="0"/>
-        </a:xfrm>
-      </p:grpSpPr>
-      <p:pic>
-        <p:nvPicPr>
-          <p:cNvPr id="5" name="Picture 4">
-            <a:extLst>
-              <a:ext uri="{FF2B5EF4-FFF2-40B4-BE49-F238E27FC236}">
-                <a16:creationId xmlns:a16="http://schemas.microsoft.com/office/drawing/2014/main" id="{256CCD31-9C25-F040-9504-CF9C5ECCF7E0}"/>
-              </a:ext>
-            </a:extLst>
-          </p:cNvPr>
-          <p:cNvPicPr/>
-          <p:nvPr/>
-        </p:nvPicPr>
-        <p:blipFill rotWithShape="1">
-          <a:blip r:embed="rId2" cstate="print">
-            <a:extLst>
-              <a:ext uri="{28A0092B-C50C-407E-A947-70E740481C1C}">
-                <a14:useLocalDpi xmlns:a14="http://schemas.microsoft.com/office/drawing/2010/main" val="0"/>
-              </a:ext>
-            </a:extLst>
-          </a:blip>
-          <a:srcRect l="3239" r="1"/>
-          <a:stretch/>
-        </p:blipFill>
-        <p:spPr bwMode="auto">
-          <a:xfrm>
-            <a:off x="1929445" y="1009313"/>
-            <a:ext cx="2372592" cy="2308324"/>
-          </a:xfrm>
-          <a:prstGeom prst="rect">
-            <a:avLst/>
-          </a:prstGeom>
-          <a:ln>
-            <a:noFill/>
-          </a:ln>
-          <a:extLst>
-            <a:ext uri="{53640926-AAD7-44D8-BBD7-CCE9431645EC}">
-              <a14:shadowObscured xmlns:a14="http://schemas.microsoft.com/office/drawing/2010/main"/>
-            </a:ext>
-          </a:extLst>
-        </p:spPr>
-      </p:pic>
-      <p:sp>
-        <p:nvSpPr>
-          <p:cNvPr id="6" name="Rectangle 5">
-            <a:extLst>
-              <a:ext uri="{FF2B5EF4-FFF2-40B4-BE49-F238E27FC236}">
-                <a16:creationId xmlns:a16="http://schemas.microsoft.com/office/drawing/2014/main" id="{7AC521A6-EA53-6249-9417-2379A244B351}"/>
-              </a:ext>
-            </a:extLst>
-          </p:cNvPr>
-          <p:cNvSpPr/>
-          <p:nvPr/>
-        </p:nvSpPr>
-        <p:spPr>
-          <a:xfrm>
-            <a:off x="1361378" y="3770443"/>
-            <a:ext cx="4158511" cy="1569660"/>
-          </a:xfrm>
-          <a:prstGeom prst="rect">
-            <a:avLst/>
-          </a:prstGeom>
-        </p:spPr>
-        <p:txBody>
-          <a:bodyPr wrap="none">
-            <a:spAutoFit/>
-          </a:bodyPr>
-          <a:lstStyle/>
-          <a:p>
-            <a:pPr>
-              <a:spcAft>
-                <a:spcPts val="1200"/>
-              </a:spcAft>
-            </a:pPr>
-            <a:r>
-              <a:rPr lang="en-US" sz="4800" dirty="0">
-                <a:solidFill>
-                  <a:srgbClr val="24292E"/>
-                </a:solidFill>
-                <a:latin typeface="Optima" panose="02000503060000020004" pitchFamily="2" charset="0"/>
-                <a:ea typeface="Times New Roman" panose="02020603050405020304" pitchFamily="18" charset="0"/>
-                <a:cs typeface="Times New Roman" panose="02020603050405020304" pitchFamily="18" charset="0"/>
-              </a:rPr>
-              <a:t>How are we </a:t>
-            </a:r>
-            <a:br>
-              <a:rPr lang="en-US" sz="4800" dirty="0">
-                <a:solidFill>
-                  <a:srgbClr val="24292E"/>
-                </a:solidFill>
-                <a:latin typeface="Optima" panose="02000503060000020004" pitchFamily="2" charset="0"/>
-                <a:ea typeface="Times New Roman" panose="02020603050405020304" pitchFamily="18" charset="0"/>
-                <a:cs typeface="Times New Roman" panose="02020603050405020304" pitchFamily="18" charset="0"/>
-              </a:rPr>
-            </a:br>
-            <a:r>
-              <a:rPr lang="en-US" sz="4800" dirty="0">
-                <a:solidFill>
-                  <a:srgbClr val="24292E"/>
-                </a:solidFill>
-                <a:latin typeface="Optima" panose="02000503060000020004" pitchFamily="2" charset="0"/>
-                <a:ea typeface="Times New Roman" panose="02020603050405020304" pitchFamily="18" charset="0"/>
-                <a:cs typeface="Times New Roman" panose="02020603050405020304" pitchFamily="18" charset="0"/>
-              </a:rPr>
-              <a:t>fulfilling these?</a:t>
-            </a:r>
-          </a:p>
-        </p:txBody>
-      </p:sp>
-      <p:sp>
-        <p:nvSpPr>
-          <p:cNvPr id="11" name="TextBox 10">
-            <a:extLst>
-              <a:ext uri="{FF2B5EF4-FFF2-40B4-BE49-F238E27FC236}">
-                <a16:creationId xmlns:a16="http://schemas.microsoft.com/office/drawing/2014/main" id="{73BBFE72-4CC4-6941-96FB-8D4DF03F49B4}"/>
-              </a:ext>
-            </a:extLst>
-          </p:cNvPr>
-          <p:cNvSpPr txBox="1"/>
-          <p:nvPr/>
-        </p:nvSpPr>
-        <p:spPr>
-          <a:xfrm>
-            <a:off x="6737742" y="474345"/>
-            <a:ext cx="4382429" cy="5909310"/>
-          </a:xfrm>
-          <a:prstGeom prst="rect">
-            <a:avLst/>
-          </a:prstGeom>
-          <a:noFill/>
-        </p:spPr>
-        <p:txBody>
-          <a:bodyPr wrap="square" rtlCol="0">
-            <a:spAutoFit/>
-          </a:bodyPr>
-          <a:lstStyle/>
-          <a:p>
-            <a:r>
-              <a:rPr lang="en-US" b="1" dirty="0">
-                <a:latin typeface="Optima" panose="02000503060000020004" pitchFamily="2" charset="0"/>
-              </a:rPr>
-              <a:t>Mission</a:t>
-            </a:r>
-          </a:p>
-          <a:p>
-            <a:r>
-              <a:rPr lang="en-US" dirty="0">
-                <a:latin typeface="Optima" panose="02000503060000020004" pitchFamily="2" charset="0"/>
-              </a:rPr>
-              <a:t>The mission of the Data Scientista Society is to educate women pursuing careers related to data science in techniques and competencies needed for career advancement and achieving leadership positions in the field.</a:t>
-            </a:r>
-          </a:p>
-          <a:p>
-            <a:endParaRPr lang="en-US" dirty="0">
-              <a:latin typeface="Optima" panose="02000503060000020004" pitchFamily="2" charset="0"/>
-            </a:endParaRPr>
-          </a:p>
-          <a:p>
-            <a:r>
-              <a:rPr lang="en-US" b="1" dirty="0">
-                <a:latin typeface="Optima" panose="02000503060000020004" pitchFamily="2" charset="0"/>
-              </a:rPr>
-              <a:t>Vision</a:t>
-            </a:r>
-          </a:p>
-          <a:p>
-            <a:r>
-              <a:rPr lang="en-US" dirty="0">
-                <a:latin typeface="Optima" panose="02000503060000020004" pitchFamily="2" charset="0"/>
-              </a:rPr>
-              <a:t>Our vision is to create a world full of data of the women, by the women, and for the women.</a:t>
-            </a:r>
-          </a:p>
-          <a:p>
-            <a:endParaRPr lang="en-US" dirty="0">
-              <a:latin typeface="Optima" panose="02000503060000020004" pitchFamily="2" charset="0"/>
-            </a:endParaRPr>
-          </a:p>
-          <a:p>
-            <a:r>
-              <a:rPr lang="en-US" b="1" dirty="0">
-                <a:latin typeface="Optima" panose="02000503060000020004" pitchFamily="2" charset="0"/>
-              </a:rPr>
-              <a:t>Modus Operandi</a:t>
-            </a:r>
-          </a:p>
-          <a:p>
-            <a:r>
-              <a:rPr lang="en-US" dirty="0">
-                <a:latin typeface="Optima" panose="02000503060000020004" pitchFamily="2" charset="0"/>
-              </a:rPr>
-              <a:t>The modus operandi of the Data Scientista Society is to build relationships among co-located women enthusiastic about data, </a:t>
-            </a:r>
-            <a:r>
-              <a:rPr lang="en-US" dirty="0" err="1">
-                <a:latin typeface="Optima" panose="02000503060000020004" pitchFamily="2" charset="0"/>
-              </a:rPr>
-              <a:t>a.k.a</a:t>
-            </a:r>
-            <a:r>
-              <a:rPr lang="en-US" dirty="0">
-                <a:latin typeface="Optima" panose="02000503060000020004" pitchFamily="2" charset="0"/>
-              </a:rPr>
-              <a:t> data </a:t>
-            </a:r>
-            <a:r>
-              <a:rPr lang="en-US" dirty="0" err="1">
-                <a:latin typeface="Optima" panose="02000503060000020004" pitchFamily="2" charset="0"/>
-              </a:rPr>
-              <a:t>scientistas</a:t>
-            </a:r>
-            <a:r>
-              <a:rPr lang="en-US" dirty="0">
-                <a:latin typeface="Optima" panose="02000503060000020004" pitchFamily="2" charset="0"/>
-              </a:rPr>
-              <a:t>, while also practicing mutual supportiveness towards competency, success, and leadership.</a:t>
-            </a:r>
-          </a:p>
-          <a:p>
-            <a:endParaRPr lang="en-US" dirty="0">
-              <a:latin typeface="Optima" panose="02000503060000020004" pitchFamily="2" charset="0"/>
-            </a:endParaRPr>
-          </a:p>
-        </p:txBody>
-      </p:sp>
-    </p:spTree>
-    <p:extLst>
-      <p:ext uri="{BB962C8B-B14F-4D97-AF65-F5344CB8AC3E}">
-        <p14:creationId xmlns:p14="http://schemas.microsoft.com/office/powerpoint/2010/main" val="4090054677"/>
       </p:ext>
     </p:extLst>
   </p:cSld>

</xml_diff>